<commit_message>
added title parameter for bar plot
</commit_message>
<xml_diff>
--- a/Texts/Atheletes_clustering.pptx
+++ b/Texts/Atheletes_clustering.pptx
@@ -545,11 +545,11 @@
           <c:showBubbleSize val="0"/>
         </c:dLbls>
         <c:gapWidth val="150"/>
-        <c:axId val="-2120107168"/>
-        <c:axId val="2115173088"/>
+        <c:axId val="-2136774368"/>
+        <c:axId val="-2136764672"/>
       </c:barChart>
       <c:catAx>
-        <c:axId val="-2120107168"/>
+        <c:axId val="-2136774368"/>
         <c:scaling>
           <c:orientation val="minMax"/>
         </c:scaling>
@@ -592,7 +592,7 @@
             <a:endParaRPr lang="en-US"/>
           </a:p>
         </c:txPr>
-        <c:crossAx val="2115173088"/>
+        <c:crossAx val="-2136764672"/>
         <c:crosses val="autoZero"/>
         <c:auto val="1"/>
         <c:lblAlgn val="ctr"/>
@@ -600,7 +600,7 @@
         <c:noMultiLvlLbl val="0"/>
       </c:catAx>
       <c:valAx>
-        <c:axId val="2115173088"/>
+        <c:axId val="-2136764672"/>
         <c:scaling>
           <c:orientation val="minMax"/>
         </c:scaling>
@@ -621,6 +621,32 @@
           </c:spPr>
         </c:majorGridlines>
         <c:title>
+          <c:tx>
+            <c:rich>
+              <a:bodyPr rot="-5400000" spcFirstLastPara="1" vertOverflow="ellipsis" vert="horz" wrap="square" anchor="ctr" anchorCtr="1"/>
+              <a:lstStyle/>
+              <a:p>
+                <a:pPr>
+                  <a:defRPr sz="1000" b="0" i="0" u="none" strike="noStrike" kern="1200" baseline="0">
+                    <a:solidFill>
+                      <a:schemeClr val="tx1">
+                        <a:lumMod val="65000"/>
+                        <a:lumOff val="35000"/>
+                      </a:schemeClr>
+                    </a:solidFill>
+                    <a:latin typeface="+mn-lt"/>
+                    <a:ea typeface="+mn-ea"/>
+                    <a:cs typeface="+mn-cs"/>
+                  </a:defRPr>
+                </a:pPr>
+                <a:r>
+                  <a:rPr lang="en-US" dirty="0" smtClean="0"/>
+                  <a:t>Pearson’s correlation</a:t>
+                </a:r>
+                <a:endParaRPr lang="en-US" dirty="0"/>
+              </a:p>
+            </c:rich>
+          </c:tx>
           <c:layout/>
           <c:overlay val="0"/>
           <c:spPr>
@@ -682,7 +708,7 @@
             <a:endParaRPr lang="en-US"/>
           </a:p>
         </c:txPr>
-        <c:crossAx val="-2120107168"/>
+        <c:crossAx val="-2136774368"/>
         <c:crosses val="autoZero"/>
         <c:crossBetween val="between"/>
       </c:valAx>
@@ -21728,7 +21754,7 @@
           <a:p>
             <a:fld id="{B3B6DFDB-3D4F-BA44-90AD-F45472BC66A5}" type="datetimeFigureOut">
               <a:rPr lang="en-US" smtClean="0"/>
-              <a:t>11/10/15</a:t>
+              <a:t>11/17/15</a:t>
             </a:fld>
             <a:endParaRPr lang="en-US"/>
           </a:p>
@@ -22730,7 +22756,7 @@
           <a:p>
             <a:fld id="{B01F9CA3-105E-4857-9057-6DB6197DA786}" type="datetimeFigureOut">
               <a:rPr lang="en-US" smtClean="0"/>
-              <a:t>11/10/15</a:t>
+              <a:t>11/17/15</a:t>
             </a:fld>
             <a:endParaRPr lang="en-US"/>
           </a:p>
@@ -22922,7 +22948,7 @@
           <a:p>
             <a:fld id="{B01F9CA3-105E-4857-9057-6DB6197DA786}" type="datetimeFigureOut">
               <a:rPr lang="en-US" smtClean="0"/>
-              <a:t>11/10/15</a:t>
+              <a:t>11/17/15</a:t>
             </a:fld>
             <a:endParaRPr lang="en-US"/>
           </a:p>
@@ -23191,7 +23217,7 @@
           <a:p>
             <a:fld id="{B01F9CA3-105E-4857-9057-6DB6197DA786}" type="datetimeFigureOut">
               <a:rPr lang="en-US" smtClean="0"/>
-              <a:t>11/10/15</a:t>
+              <a:t>11/17/15</a:t>
             </a:fld>
             <a:endParaRPr lang="en-US"/>
           </a:p>
@@ -23370,7 +23396,7 @@
           <a:p>
             <a:fld id="{B01F9CA3-105E-4857-9057-6DB6197DA786}" type="datetimeFigureOut">
               <a:rPr lang="en-US" smtClean="0"/>
-              <a:t>11/10/15</a:t>
+              <a:t>11/17/15</a:t>
             </a:fld>
             <a:endParaRPr lang="en-US"/>
           </a:p>
@@ -23539,7 +23565,7 @@
           <a:p>
             <a:fld id="{B01F9CA3-105E-4857-9057-6DB6197DA786}" type="datetimeFigureOut">
               <a:rPr lang="en-US" smtClean="0"/>
-              <a:t>11/10/15</a:t>
+              <a:t>11/17/15</a:t>
             </a:fld>
             <a:endParaRPr lang="en-US"/>
           </a:p>
@@ -23781,7 +23807,7 @@
           <a:p>
             <a:fld id="{B01F9CA3-105E-4857-9057-6DB6197DA786}" type="datetimeFigureOut">
               <a:rPr lang="en-US" smtClean="0"/>
-              <a:t>11/10/15</a:t>
+              <a:t>11/17/15</a:t>
             </a:fld>
             <a:endParaRPr lang="en-US"/>
           </a:p>
@@ -24104,7 +24130,7 @@
           <a:p>
             <a:fld id="{B01F9CA3-105E-4857-9057-6DB6197DA786}" type="datetimeFigureOut">
               <a:rPr lang="en-US" smtClean="0"/>
-              <a:t>11/10/15</a:t>
+              <a:t>11/17/15</a:t>
             </a:fld>
             <a:endParaRPr lang="en-US"/>
           </a:p>
@@ -24402,7 +24428,7 @@
           <a:p>
             <a:fld id="{B01F9CA3-105E-4857-9057-6DB6197DA786}" type="datetimeFigureOut">
               <a:rPr lang="en-US" smtClean="0"/>
-              <a:t>11/10/15</a:t>
+              <a:t>11/17/15</a:t>
             </a:fld>
             <a:endParaRPr lang="en-US"/>
           </a:p>
@@ -24858,7 +24884,7 @@
           <a:p>
             <a:fld id="{B01F9CA3-105E-4857-9057-6DB6197DA786}" type="datetimeFigureOut">
               <a:rPr lang="en-US" smtClean="0"/>
-              <a:t>11/10/15</a:t>
+              <a:t>11/17/15</a:t>
             </a:fld>
             <a:endParaRPr lang="en-US"/>
           </a:p>
@@ -24971,7 +24997,7 @@
           <a:p>
             <a:fld id="{B01F9CA3-105E-4857-9057-6DB6197DA786}" type="datetimeFigureOut">
               <a:rPr lang="en-US" smtClean="0"/>
-              <a:t>11/10/15</a:t>
+              <a:t>11/17/15</a:t>
             </a:fld>
             <a:endParaRPr lang="en-US"/>
           </a:p>
@@ -25061,7 +25087,7 @@
           <a:p>
             <a:fld id="{B01F9CA3-105E-4857-9057-6DB6197DA786}" type="datetimeFigureOut">
               <a:rPr lang="en-US" smtClean="0"/>
-              <a:t>11/10/15</a:t>
+              <a:t>11/17/15</a:t>
             </a:fld>
             <a:endParaRPr lang="en-US"/>
           </a:p>
@@ -25343,7 +25369,7 @@
           <a:p>
             <a:fld id="{B01F9CA3-105E-4857-9057-6DB6197DA786}" type="datetimeFigureOut">
               <a:rPr lang="en-US" smtClean="0"/>
-              <a:t>11/10/15</a:t>
+              <a:t>11/17/15</a:t>
             </a:fld>
             <a:endParaRPr lang="en-US"/>
           </a:p>
@@ -25549,7 +25575,7 @@
           <a:p>
             <a:fld id="{B01F9CA3-105E-4857-9057-6DB6197DA786}" type="datetimeFigureOut">
               <a:rPr lang="en-US" smtClean="0"/>
-              <a:t>11/10/15</a:t>
+              <a:t>11/17/15</a:t>
             </a:fld>
             <a:endParaRPr lang="en-US"/>
           </a:p>
@@ -26292,7 +26318,7 @@
             <p:ph idx="1"/>
             <p:extLst>
               <p:ext uri="{D42A27DB-BD31-4B8C-83A1-F6EECF244321}">
-                <p14:modId xmlns:p14="http://schemas.microsoft.com/office/powerpoint/2010/main" val="625577382"/>
+                <p14:modId xmlns:p14="http://schemas.microsoft.com/office/powerpoint/2010/main" val="1541224596"/>
               </p:ext>
             </p:extLst>
           </p:nvPr>
@@ -26307,6 +26333,36 @@
           </a:graphicData>
         </a:graphic>
       </p:graphicFrame>
+      <p:sp>
+        <p:nvSpPr>
+          <p:cNvPr id="3" name="TextBox 2"/>
+          <p:cNvSpPr txBox="1"/>
+          <p:nvPr/>
+        </p:nvSpPr>
+        <p:spPr>
+          <a:xfrm>
+            <a:off x="709864" y="5293895"/>
+            <a:ext cx="818147" cy="230832"/>
+          </a:xfrm>
+          <a:prstGeom prst="rect">
+            <a:avLst/>
+          </a:prstGeom>
+          <a:noFill/>
+        </p:spPr>
+        <p:txBody>
+          <a:bodyPr wrap="square" rtlCol="0">
+            <a:spAutoFit/>
+          </a:bodyPr>
+          <a:lstStyle/>
+          <a:p>
+            <a:r>
+              <a:rPr lang="en-US" sz="900" dirty="0" smtClean="0"/>
+              <a:t>channels</a:t>
+            </a:r>
+            <a:endParaRPr lang="en-US" sz="900" dirty="0"/>
+          </a:p>
+        </p:txBody>
+      </p:sp>
     </p:spTree>
     <p:extLst>
       <p:ext uri="{BB962C8B-B14F-4D97-AF65-F5344CB8AC3E}">
@@ -30213,7 +30269,7 @@
           <a:graphicData uri="http://schemas.openxmlformats.org/presentationml/2006/ole">
             <mc:AlternateContent xmlns:mc="http://schemas.openxmlformats.org/markup-compatibility/2006">
               <mc:Choice xmlns:v="urn:schemas-microsoft-com:vml" Requires="v">
-                <p:oleObj spid="_x0000_s1320" name="Worksheet" r:id="rId4" imgW="3314700" imgH="1536700" progId="Excel.Sheet.12">
+                <p:oleObj spid="_x0000_s1326" name="Worksheet" r:id="rId4" imgW="3314700" imgH="1536700" progId="Excel.Sheet.12">
                   <p:embed/>
                 </p:oleObj>
               </mc:Choice>
@@ -30434,7 +30490,7 @@
           <a:graphicData uri="http://schemas.openxmlformats.org/presentationml/2006/ole">
             <mc:AlternateContent xmlns:mc="http://schemas.openxmlformats.org/markup-compatibility/2006">
               <mc:Choice xmlns:v="urn:schemas-microsoft-com:vml" Requires="v">
-                <p:oleObj spid="_x0000_s2316" name="Worksheet" r:id="rId4" imgW="7442200" imgH="393700" progId="Excel.Sheet.12">
+                <p:oleObj spid="_x0000_s2322" name="Worksheet" r:id="rId4" imgW="7442200" imgH="393700" progId="Excel.Sheet.12">
                   <p:embed/>
                 </p:oleObj>
               </mc:Choice>

</xml_diff>